<commit_message>
econ 210a & econ 115 zoom...
</commit_message>
<xml_diff>
--- a/econ-210a-lecture-10a.pptx
+++ b/econ-210a-lecture-10a.pptx
@@ -41,8 +41,6 @@
     <p:sldId id="286" r:id="rId38"/>
     <p:sldId id="287" r:id="rId39"/>
     <p:sldId id="288" r:id="rId40"/>
-    <p:sldId id="289" r:id="rId41"/>
-    <p:sldId id="290" r:id="rId42"/>
   </p:sldIdLst>
   <p:sldSz cx="9144000" cy="6858000"/>
   <p:notesSz cx="6858000" cy="9144000"/>
@@ -1371,200 +1369,6 @@
       <p:sp>
         <p:nvSpPr>
           <p:cNvPr id="208" name="Shape 208"/>
-          <p:cNvSpPr/>
-          <p:nvPr>
-            <p:ph type="body" sz="quarter" idx="1"/>
-          </p:nvPr>
-        </p:nvSpPr>
-        <p:spPr>
-          <a:prstGeom prst="rect">
-            <a:avLst/>
-          </a:prstGeom>
-        </p:spPr>
-        <p:txBody>
-          <a:bodyPr/>
-          <a:lstStyle/>
-          <a:p>
-            <a:pPr/>
-            <a:r>
-              <a:t>The answer to the question of "where is the win-win here?" is rather complex. There are four ways in which capital market transactions can be win-win.</a:t>
-            </a:r>
-          </a:p>
-          <a:p>
-            <a:pPr/>
-          </a:p>
-          <a:p>
-            <a:pPr/>
-            <a:r>
-              <a:t>First, the counterparties can be exchanging generalized purchasing power, but generalized purchasing power to be spent at different dates. One counterparty can be borrowing in order to fund immediate consumption in excess of its current resources. Thus they are happy because what they lack is generalized purchasing power now. The other counterparty, by contrast, places is a low value on the possession of generalized purchasing power now relative to the future. The win-win here is this the creation of liquidity for those who have or rather suffer from urgency and would like to scratch some particular itch right now.</a:t>
-            </a:r>
-          </a:p>
-          <a:p>
-            <a:pPr/>
-          </a:p>
-          <a:p>
-            <a:pPr/>
-            <a:r>
-              <a:t>Second, the counterparties can be trading generalized purchasing power in different states of the world. In some states of the world, I will be desperately anxious to have more generalized purchasing power. And in others, I will be flush and my marginal utility of wealth will be low. Capital market trades that move my wealth from states of the world in which I have a low to stay till the world in which I have a high marginal utility of wealth are enormously beneficial to me. And if I can find a counterparty whose marginal the utility of wealth gradient across different potential states of the world is different, the exchanges can be win-win. Risk management, diversification, insurance—the win-win nature of these transactions is obvious.</a:t>
-            </a:r>
-          </a:p>
-          <a:p>
-            <a:pPr/>
-          </a:p>
-          <a:p>
-            <a:pPr/>
-            <a:r>
-              <a:t>Third, capital market transactions can move wealth so as to place it under different peoples control. This has the powerful potential of aligning incentives: by giving one's agents a stake in the action, one can be much more sure that they will be reliable agents. Moreover, capital market transactions can serve as signals as to when principal-agent relationships are going awry: rollover requirements and relationship banking are very important ways of managing wealth, and aligning agents incentives even outside the narrow corporate governance context.</a:t>
-            </a:r>
-          </a:p>
-          <a:p>
-            <a:pPr/>
-          </a:p>
-          <a:p>
-            <a:pPr/>
-            <a:r>
-              <a:t>Fourth, capital market transactions can achieve some sort of scale. They can mobilize the savings of lots of individuals in order to make possible a large and highly efficient enterprise. And economies of scale can create great convenience. That's the point of means of payment and intermediation transactions–those who have an expertise in doing them cheaply should do them, and take the load off of others, in return for a fee.</a:t>
-            </a:r>
-          </a:p>
-          <a:p>
-            <a:pPr/>
-          </a:p>
-          <a:p>
-            <a:pPr/>
-            <a:r>
-              <a:t>Thus we have four margins along which capital market transactions can be genuinely win-win for both parties and so fit into our standard market template of supply and demand and producer and consumer surplus. But, usually, these margins are small—and this makes capital markets and their transactions fraught in the way that normal consumer markets are not.</a:t>
-            </a:r>
-          </a:p>
-        </p:txBody>
-      </p:sp>
-    </p:spTree>
-  </p:cSld>
-  <p:clrMapOvr>
-    <a:masterClrMapping/>
-  </p:clrMapOvr>
-</p:notes>
-</file>
-
-<file path=ppt/notesSlides/notesSlide17.xml><?xml version="1.0" encoding="utf-8"?>
-<p:notes xmlns:a="http://schemas.openxmlformats.org/drawingml/2006/main" xmlns:r="http://schemas.openxmlformats.org/officeDocument/2006/relationships" xmlns:p="http://schemas.openxmlformats.org/presentationml/2006/main" xmlns:m="http://schemas.openxmlformats.org/officeDocument/2006/math" xmlns:a14="http://schemas.microsoft.com/office/drawing/2010/main" showMasterSp="1" showMasterPhAnim="1">
-  <p:cSld>
-    <p:spTree>
-      <p:nvGrpSpPr>
-        <p:cNvPr id="1" name=""/>
-        <p:cNvGrpSpPr/>
-        <p:nvPr/>
-      </p:nvGrpSpPr>
-      <p:grpSpPr>
-        <a:xfrm>
-          <a:off x="0" y="0"/>
-          <a:ext cx="0" cy="0"/>
-          <a:chOff x="0" y="0"/>
-          <a:chExt cx="0" cy="0"/>
-        </a:xfrm>
-      </p:grpSpPr>
-      <p:sp>
-        <p:nvSpPr>
-          <p:cNvPr id="214" name="Shape 214"/>
-          <p:cNvSpPr/>
-          <p:nvPr>
-            <p:ph type="sldImg"/>
-          </p:nvPr>
-        </p:nvSpPr>
-        <p:spPr>
-          <a:prstGeom prst="rect">
-            <a:avLst/>
-          </a:prstGeom>
-        </p:spPr>
-        <p:txBody>
-          <a:bodyPr/>
-          <a:lstStyle/>
-          <a:p>
-            <a:pPr/>
-          </a:p>
-        </p:txBody>
-      </p:sp>
-      <p:sp>
-        <p:nvSpPr>
-          <p:cNvPr id="215" name="Shape 215"/>
-          <p:cNvSpPr/>
-          <p:nvPr>
-            <p:ph type="body" sz="quarter" idx="1"/>
-          </p:nvPr>
-        </p:nvSpPr>
-        <p:spPr>
-          <a:prstGeom prst="rect">
-            <a:avLst/>
-          </a:prstGeom>
-        </p:spPr>
-        <p:txBody>
-          <a:bodyPr/>
-          <a:lstStyle/>
-          <a:p>
-            <a:pPr/>
-            <a:r>
-              <a:t>Normally in a market economy it is quite clear that voluntary exchanges are win-win, and very clear why they are win-win. One party is exchanging generalized purchasing power in the form of money for a commodity that has a substantial use value, a use value larger then what they could believe they could get at the margin from holding onto their money or spending it in alternative ways. The other party has a commodity that has a very low use value for them, and would rather have generalized purchasing power. When I buy coffee from Peets both of us are happy: I get caffeinated, and that is worth much more to me than the money I have to pay; they get money, and that is worth much more to them than the marginal cup of coffee they have made. If the Peets employees drank all the coffee they made in the day, they were die: coffee is poisonous in large doses.</a:t>
-            </a:r>
-          </a:p>
-          <a:p>
-            <a:pPr/>
-          </a:p>
-          <a:p>
-            <a:pPr/>
-            <a:r>
-              <a:t>Capital markets are different. In capital markets people are trading money—generalized puchasing power—for money. Where, then, is the win-win here? How do these markets fit into this standard template of supply-and-demand and of producer and consumer surplus that we use to understand markets and their benefits?</a:t>
-            </a:r>
-          </a:p>
-        </p:txBody>
-      </p:sp>
-    </p:spTree>
-  </p:cSld>
-  <p:clrMapOvr>
-    <a:masterClrMapping/>
-  </p:clrMapOvr>
-</p:notes>
-</file>
-
-<file path=ppt/notesSlides/notesSlide18.xml><?xml version="1.0" encoding="utf-8"?>
-<p:notes xmlns:a="http://schemas.openxmlformats.org/drawingml/2006/main" xmlns:r="http://schemas.openxmlformats.org/officeDocument/2006/relationships" xmlns:p="http://schemas.openxmlformats.org/presentationml/2006/main" xmlns:m="http://schemas.openxmlformats.org/officeDocument/2006/math" xmlns:a14="http://schemas.microsoft.com/office/drawing/2010/main" showMasterSp="1" showMasterPhAnim="1">
-  <p:cSld>
-    <p:spTree>
-      <p:nvGrpSpPr>
-        <p:cNvPr id="1" name=""/>
-        <p:cNvGrpSpPr/>
-        <p:nvPr/>
-      </p:nvGrpSpPr>
-      <p:grpSpPr>
-        <a:xfrm>
-          <a:off x="0" y="0"/>
-          <a:ext cx="0" cy="0"/>
-          <a:chOff x="0" y="0"/>
-          <a:chExt cx="0" cy="0"/>
-        </a:xfrm>
-      </p:grpSpPr>
-      <p:sp>
-        <p:nvSpPr>
-          <p:cNvPr id="221" name="Shape 221"/>
-          <p:cNvSpPr/>
-          <p:nvPr>
-            <p:ph type="sldImg"/>
-          </p:nvPr>
-        </p:nvSpPr>
-        <p:spPr>
-          <a:prstGeom prst="rect">
-            <a:avLst/>
-          </a:prstGeom>
-        </p:spPr>
-        <p:txBody>
-          <a:bodyPr/>
-          <a:lstStyle/>
-          <a:p>
-            <a:pPr/>
-          </a:p>
-        </p:txBody>
-      </p:sp>
-      <p:sp>
-        <p:nvSpPr>
-          <p:cNvPr id="222" name="Shape 222"/>
           <p:cNvSpPr/>
           <p:nvPr>
             <p:ph type="body" sz="quarter" idx="1"/>
@@ -5019,8 +4823,8 @@
         </p:nvSpPr>
         <p:spPr>
           <a:xfrm>
-            <a:off x="444500" y="1587499"/>
-            <a:ext cx="8255000" cy="4937521"/>
+            <a:off x="444500" y="1587500"/>
+            <a:ext cx="8255000" cy="4937520"/>
           </a:xfrm>
           <a:prstGeom prst="rect">
             <a:avLst/>
@@ -6567,8 +6371,8 @@
         </p:blipFill>
         <p:spPr>
           <a:xfrm>
-            <a:off x="5280527" y="1269999"/>
-            <a:ext cx="3569637" cy="5217161"/>
+            <a:off x="5280527" y="1270000"/>
+            <a:ext cx="3569637" cy="5217160"/>
           </a:xfrm>
           <a:prstGeom prst="rect">
             <a:avLst/>
@@ -7797,8 +7601,8 @@
         </p:blipFill>
         <p:spPr>
           <a:xfrm>
-            <a:off x="4531706" y="1269999"/>
-            <a:ext cx="4292601" cy="3188518"/>
+            <a:off x="4531706" y="1270000"/>
+            <a:ext cx="4292601" cy="3188517"/>
           </a:xfrm>
           <a:prstGeom prst="rect">
             <a:avLst/>
@@ -7852,8 +7656,8 @@
         </p:blipFill>
         <p:spPr>
           <a:xfrm>
-            <a:off x="366106" y="368299"/>
-            <a:ext cx="8419793" cy="6254171"/>
+            <a:off x="366106" y="368300"/>
+            <a:ext cx="8419793" cy="6254170"/>
           </a:xfrm>
           <a:prstGeom prst="rect">
             <a:avLst/>
@@ -11828,679 +11632,7 @@
       </p:grpSpPr>
       <p:sp>
         <p:nvSpPr>
-          <p:cNvPr id="210" name="American Exceptionalism"/>
-          <p:cNvSpPr txBox="1"/>
-          <p:nvPr>
-            <p:ph type="title" idx="4294967295"/>
-          </p:nvPr>
-        </p:nvSpPr>
-        <p:spPr>
-          <a:xfrm>
-            <a:off x="277663" y="-1"/>
-            <a:ext cx="8572501" cy="1270001"/>
-          </a:xfrm>
-          <a:prstGeom prst="rect">
-            <a:avLst/>
-          </a:prstGeom>
-        </p:spPr>
-        <p:txBody>
-          <a:bodyPr>
-            <a:normAutofit fontScale="100000" lnSpcReduction="0"/>
-          </a:bodyPr>
-          <a:lstStyle>
-            <a:lvl1pPr defTabSz="310895">
-              <a:lnSpc>
-                <a:spcPts val="7800"/>
-              </a:lnSpc>
-              <a:defRPr sz="5440"/>
-            </a:lvl1pPr>
-          </a:lstStyle>
-          <a:p>
-            <a:pPr/>
-            <a:r>
-              <a:t>American Exceptionalism</a:t>
-            </a:r>
-          </a:p>
-        </p:txBody>
-      </p:sp>
-      <p:sp>
-        <p:nvSpPr>
-          <p:cNvPr id="211" name="Two from John Maynard Keynes:…"/>
-          <p:cNvSpPr txBox="1"/>
-          <p:nvPr>
-            <p:ph type="body" idx="4294967295"/>
-          </p:nvPr>
-        </p:nvSpPr>
-        <p:spPr>
-          <a:xfrm>
-            <a:off x="277663" y="1270000"/>
-            <a:ext cx="5002865" cy="5080000"/>
-          </a:xfrm>
-          <a:prstGeom prst="rect">
-            <a:avLst/>
-          </a:prstGeom>
-        </p:spPr>
-        <p:txBody>
-          <a:bodyPr>
-            <a:normAutofit fontScale="100000" lnSpcReduction="0"/>
-          </a:bodyPr>
-          <a:lstStyle/>
-          <a:p>
-            <a:pPr marL="0" indent="0" defTabSz="283463">
-              <a:buSzTx/>
-              <a:buFontTx/>
-              <a:buNone/>
-              <a:defRPr b="1" sz="1860">
-                <a:solidFill>
-                  <a:srgbClr val="000080"/>
-                </a:solidFill>
-                <a:latin typeface="+mn-lt"/>
-                <a:ea typeface="+mn-ea"/>
-                <a:cs typeface="+mn-cs"/>
-                <a:sym typeface="Helvetica"/>
-              </a:defRPr>
-            </a:pPr>
-            <a:r>
-              <a:t>Two from John Maynard Keynes:</a:t>
-            </a:r>
-          </a:p>
-          <a:p>
-            <a:pPr marL="212597" indent="-212597" defTabSz="283463">
-              <a:defRPr sz="1488">
-                <a:latin typeface="Times New Roman"/>
-                <a:ea typeface="Times New Roman"/>
-                <a:cs typeface="Times New Roman"/>
-                <a:sym typeface="Times New Roman"/>
-              </a:defRPr>
-            </a:pPr>
-            <a:r>
-              <a:t>Reaction to WWI &amp; the peace treaty</a:t>
-            </a:r>
-          </a:p>
-          <a:p>
-            <a:pPr lvl="1" marL="496061" indent="-212597" defTabSz="283463">
-              <a:buChar char="•"/>
-              <a:defRPr sz="1488">
-                <a:latin typeface="Times New Roman"/>
-                <a:ea typeface="Times New Roman"/>
-                <a:cs typeface="Times New Roman"/>
-                <a:sym typeface="Times New Roman"/>
-              </a:defRPr>
-            </a:pPr>
-            <a:r>
-              <a:t>Pre-WWI “El Dorado” fragile</a:t>
-            </a:r>
-          </a:p>
-          <a:p>
-            <a:pPr lvl="1" marL="496061" indent="-212597" defTabSz="283463">
-              <a:buChar char="•"/>
-              <a:defRPr sz="1488">
-                <a:latin typeface="Times New Roman"/>
-                <a:ea typeface="Times New Roman"/>
-                <a:cs typeface="Times New Roman"/>
-                <a:sym typeface="Times New Roman"/>
-              </a:defRPr>
-            </a:pPr>
-            <a:r>
-              <a:t>Peace treaty an absolute disaster</a:t>
-            </a:r>
-          </a:p>
-          <a:p>
-            <a:pPr lvl="1" marL="496061" indent="-212597" defTabSz="283463">
-              <a:buChar char="•"/>
-              <a:defRPr sz="1488">
-                <a:latin typeface="Times New Roman"/>
-                <a:ea typeface="Times New Roman"/>
-                <a:cs typeface="Times New Roman"/>
-                <a:sym typeface="Times New Roman"/>
-              </a:defRPr>
-            </a:pPr>
-            <a:r>
-              <a:t>Viewing newly-democratic Germany as an enemy from which resources were to be abstracted a mistake</a:t>
-            </a:r>
-          </a:p>
-          <a:p>
-            <a:pPr marL="212597" indent="-212597" defTabSz="283463">
-              <a:defRPr sz="1488">
-                <a:latin typeface="Times New Roman"/>
-                <a:ea typeface="Times New Roman"/>
-                <a:cs typeface="Times New Roman"/>
-                <a:sym typeface="Times New Roman"/>
-              </a:defRPr>
-            </a:pPr>
-            <a:r>
-              <a:t>Reaction to post-WWI attempts at normalization:</a:t>
-            </a:r>
-          </a:p>
-          <a:p>
-            <a:pPr lvl="1" marL="496061" indent="-212597" defTabSz="283463">
-              <a:buChar char="•"/>
-              <a:defRPr sz="1488">
-                <a:latin typeface="Times New Roman"/>
-                <a:ea typeface="Times New Roman"/>
-                <a:cs typeface="Times New Roman"/>
-                <a:sym typeface="Times New Roman"/>
-              </a:defRPr>
-            </a:pPr>
-            <a:r>
-              <a:t>Austerity a huge mistake</a:t>
-            </a:r>
-          </a:p>
-          <a:p>
-            <a:pPr lvl="1" marL="496061" indent="-212597" defTabSz="283463">
-              <a:buChar char="•"/>
-              <a:defRPr sz="1488">
-                <a:latin typeface="Times New Roman"/>
-                <a:ea typeface="Times New Roman"/>
-                <a:cs typeface="Times New Roman"/>
-                <a:sym typeface="Times New Roman"/>
-              </a:defRPr>
-            </a:pPr>
-            <a:r>
-              <a:t>Not the case that: “The market giveth, the market taketh away, blessed be the name of the market”</a:t>
-            </a:r>
-          </a:p>
-          <a:p>
-            <a:pPr lvl="1" marL="496061" indent="-212597" defTabSz="283463">
-              <a:buChar char="•"/>
-              <a:defRPr sz="1488">
-                <a:latin typeface="Times New Roman"/>
-                <a:ea typeface="Times New Roman"/>
-                <a:cs typeface="Times New Roman"/>
-                <a:sym typeface="Times New Roman"/>
-              </a:defRPr>
-            </a:pPr>
-            <a:r>
-              <a:t>Rather: “The market was made for man; not man for the market”</a:t>
-            </a:r>
-          </a:p>
-          <a:p>
-            <a:pPr marL="212597" indent="-212597" defTabSz="283463">
-              <a:defRPr sz="1488">
-                <a:latin typeface="Times New Roman"/>
-                <a:ea typeface="Times New Roman"/>
-                <a:cs typeface="Times New Roman"/>
-                <a:sym typeface="Times New Roman"/>
-              </a:defRPr>
-            </a:pPr>
-            <a:r>
-              <a:t>Peer through the web of finance at the real decisions being made underneath</a:t>
-            </a:r>
-          </a:p>
-          <a:p>
-            <a:pPr marL="212597" indent="-212597" defTabSz="283463">
-              <a:defRPr sz="1488">
-                <a:latin typeface="Times New Roman"/>
-                <a:ea typeface="Times New Roman"/>
-                <a:cs typeface="Times New Roman"/>
-                <a:sym typeface="Times New Roman"/>
-              </a:defRPr>
-            </a:pPr>
-            <a:r>
-              <a:t>Rearrange the web of finance and claims so that it was, well, sensible</a:t>
-            </a:r>
-          </a:p>
-          <a:p>
-            <a:pPr marL="212597" indent="-212597" defTabSz="283463">
-              <a:defRPr sz="1488">
-                <a:latin typeface="Times New Roman"/>
-                <a:ea typeface="Times New Roman"/>
-                <a:cs typeface="Times New Roman"/>
-                <a:sym typeface="Times New Roman"/>
-              </a:defRPr>
-            </a:pPr>
-            <a:r>
-              <a:t>A viewpoint very hostile to ideas of “austerity” and “confidence”</a:t>
-            </a:r>
-          </a:p>
-        </p:txBody>
-      </p:sp>
-      <p:sp>
-        <p:nvSpPr>
-          <p:cNvPr id="212" name="1:00"/>
-          <p:cNvSpPr txBox="1"/>
-          <p:nvPr/>
-        </p:nvSpPr>
-        <p:spPr>
-          <a:xfrm>
-            <a:off x="969826" y="6487159"/>
-            <a:ext cx="512898" cy="370841"/>
-          </a:xfrm>
-          <a:prstGeom prst="rect">
-            <a:avLst/>
-          </a:prstGeom>
-          <a:ln w="12700">
-            <a:miter lim="400000"/>
-          </a:ln>
-          <a:extLst>
-            <a:ext uri="{C572A759-6A51-4108-AA02-DFA0A04FC94B}">
-              <ma14:wrappingTextBoxFlag xmlns:ma14="http://schemas.microsoft.com/office/mac/drawingml/2011/main" val="1"/>
-            </a:ext>
-          </a:extLst>
-        </p:spPr>
-        <p:txBody>
-          <a:bodyPr wrap="none" lIns="45719" rIns="45719">
-            <a:spAutoFit/>
-          </a:bodyPr>
-          <a:lstStyle/>
-          <a:p>
-            <a:pPr/>
-            <a:r>
-              <a:t>1:00</a:t>
-            </a:r>
-          </a:p>
-        </p:txBody>
-      </p:sp>
-      <p:pic>
-        <p:nvPicPr>
-          <p:cNvPr id="213" name="Image" descr="Image"/>
-          <p:cNvPicPr>
-            <a:picLocks noChangeAspect="1"/>
-          </p:cNvPicPr>
-          <p:nvPr/>
-        </p:nvPicPr>
-        <p:blipFill>
-          <a:blip r:embed="rId3">
-            <a:extLst/>
-          </a:blip>
-          <a:stretch>
-            <a:fillRect/>
-          </a:stretch>
-        </p:blipFill>
-        <p:spPr>
-          <a:xfrm>
-            <a:off x="5280527" y="1270000"/>
-            <a:ext cx="3569637" cy="5217160"/>
-          </a:xfrm>
-          <a:prstGeom prst="rect">
-            <a:avLst/>
-          </a:prstGeom>
-          <a:ln w="12700">
-            <a:miter lim="400000"/>
-          </a:ln>
-        </p:spPr>
-      </p:pic>
-    </p:spTree>
-  </p:cSld>
-  <p:clrMapOvr>
-    <a:masterClrMapping/>
-  </p:clrMapOvr>
-  <p:transition xmlns:p14="http://schemas.microsoft.com/office/powerpoint/2010/main" spd="med" advClick="1"/>
-</p:sld>
-</file>
-
-<file path=ppt/slides/slide34.xml><?xml version="1.0" encoding="utf-8"?>
-<p:sld xmlns:a="http://schemas.openxmlformats.org/drawingml/2006/main" xmlns:r="http://schemas.openxmlformats.org/officeDocument/2006/relationships" xmlns:p="http://schemas.openxmlformats.org/presentationml/2006/main" xmlns:m="http://schemas.openxmlformats.org/officeDocument/2006/math" xmlns:a14="http://schemas.microsoft.com/office/drawing/2010/main" showMasterSp="1" showMasterPhAnim="1">
-  <p:cSld>
-    <p:spTree>
-      <p:nvGrpSpPr>
-        <p:cNvPr id="1" name=""/>
-        <p:cNvGrpSpPr/>
-        <p:nvPr/>
-      </p:nvGrpSpPr>
-      <p:grpSpPr>
-        <a:xfrm>
-          <a:off x="0" y="0"/>
-          <a:ext cx="0" cy="0"/>
-          <a:chOff x="0" y="0"/>
-          <a:chExt cx="0" cy="0"/>
-        </a:xfrm>
-      </p:grpSpPr>
-      <p:sp>
-        <p:nvSpPr>
-          <p:cNvPr id="217" name="The Economic Consequences of Mr.  Churchill"/>
-          <p:cNvSpPr txBox="1"/>
-          <p:nvPr>
-            <p:ph type="title" idx="4294967295"/>
-          </p:nvPr>
-        </p:nvSpPr>
-        <p:spPr>
-          <a:xfrm>
-            <a:off x="277663" y="-1"/>
-            <a:ext cx="8572501" cy="1270001"/>
-          </a:xfrm>
-          <a:prstGeom prst="rect">
-            <a:avLst/>
-          </a:prstGeom>
-        </p:spPr>
-        <p:txBody>
-          <a:bodyPr>
-            <a:normAutofit fontScale="100000" lnSpcReduction="0"/>
-          </a:bodyPr>
-          <a:lstStyle>
-            <a:lvl1pPr defTabSz="214884">
-              <a:lnSpc>
-                <a:spcPts val="5400"/>
-              </a:lnSpc>
-              <a:defRPr sz="3759">
-                <a:solidFill>
-                  <a:srgbClr val="000080"/>
-                </a:solidFill>
-              </a:defRPr>
-            </a:lvl1pPr>
-          </a:lstStyle>
-          <a:p>
-            <a:pPr/>
-            <a:r>
-              <a:t>The Economic Consequences of Mr.  Churchill</a:t>
-            </a:r>
-          </a:p>
-        </p:txBody>
-      </p:sp>
-      <p:sp>
-        <p:nvSpPr>
-          <p:cNvPr id="218" name="Where, then, is the win-win here?:…"/>
-          <p:cNvSpPr txBox="1"/>
-          <p:nvPr>
-            <p:ph type="body" idx="4294967295"/>
-          </p:nvPr>
-        </p:nvSpPr>
-        <p:spPr>
-          <a:xfrm>
-            <a:off x="277663" y="1270000"/>
-            <a:ext cx="5080001" cy="5080000"/>
-          </a:xfrm>
-          <a:prstGeom prst="rect">
-            <a:avLst/>
-          </a:prstGeom>
-        </p:spPr>
-        <p:txBody>
-          <a:bodyPr>
-            <a:normAutofit fontScale="100000" lnSpcReduction="0"/>
-          </a:bodyPr>
-          <a:lstStyle/>
-          <a:p>
-            <a:pPr marL="0" indent="0" defTabSz="329184">
-              <a:spcBef>
-                <a:spcPts val="800"/>
-              </a:spcBef>
-              <a:buSzTx/>
-              <a:buFontTx/>
-              <a:buNone/>
-              <a:defRPr b="1" sz="2160">
-                <a:solidFill>
-                  <a:srgbClr val="000080"/>
-                </a:solidFill>
-                <a:latin typeface="+mn-lt"/>
-                <a:ea typeface="+mn-ea"/>
-                <a:cs typeface="+mn-cs"/>
-                <a:sym typeface="Helvetica"/>
-              </a:defRPr>
-            </a:pPr>
-            <a:r>
-              <a:t>Where, then, is the win-win here?:</a:t>
-            </a:r>
-          </a:p>
-          <a:p>
-            <a:pPr marL="231006" indent="-231006" defTabSz="329184">
-              <a:spcBef>
-                <a:spcPts val="800"/>
-              </a:spcBef>
-              <a:buFontTx/>
-              <a:buAutoNum type="arabicPeriod" startAt="1"/>
-              <a:defRPr sz="1728">
-                <a:latin typeface="Times New Roman"/>
-                <a:ea typeface="Times New Roman"/>
-                <a:cs typeface="Times New Roman"/>
-                <a:sym typeface="Times New Roman"/>
-              </a:defRPr>
-            </a:pPr>
-            <a:r>
-              <a:t>At different times (liquidity)</a:t>
-            </a:r>
-          </a:p>
-          <a:p>
-            <a:pPr lvl="1" marL="576071" indent="-246887" defTabSz="329184">
-              <a:spcBef>
-                <a:spcPts val="800"/>
-              </a:spcBef>
-              <a:buChar char="•"/>
-              <a:defRPr sz="1728">
-                <a:latin typeface="Times New Roman"/>
-                <a:ea typeface="Times New Roman"/>
-                <a:cs typeface="Times New Roman"/>
-                <a:sym typeface="Times New Roman"/>
-              </a:defRPr>
-            </a:pPr>
-            <a:r>
-              <a:t>To fund immediate consumption</a:t>
-            </a:r>
-          </a:p>
-          <a:p>
-            <a:pPr lvl="1" marL="576071" indent="-246887" defTabSz="329184">
-              <a:spcBef>
-                <a:spcPts val="800"/>
-              </a:spcBef>
-              <a:buChar char="•"/>
-              <a:defRPr sz="1728">
-                <a:latin typeface="Times New Roman"/>
-                <a:ea typeface="Times New Roman"/>
-                <a:cs typeface="Times New Roman"/>
-                <a:sym typeface="Times New Roman"/>
-              </a:defRPr>
-            </a:pPr>
-            <a:r>
-              <a:t>To fund productive investment</a:t>
-            </a:r>
-          </a:p>
-          <a:p>
-            <a:pPr marL="231006" indent="-231006" defTabSz="329184">
-              <a:spcBef>
-                <a:spcPts val="800"/>
-              </a:spcBef>
-              <a:buFontTx/>
-              <a:buAutoNum type="arabicPeriod" startAt="1"/>
-              <a:defRPr sz="1728">
-                <a:latin typeface="Times New Roman"/>
-                <a:ea typeface="Times New Roman"/>
-                <a:cs typeface="Times New Roman"/>
-                <a:sym typeface="Times New Roman"/>
-              </a:defRPr>
-            </a:pPr>
-            <a:r>
-              <a:t>In different states of the world (risk, diversification, insurance)</a:t>
-            </a:r>
-          </a:p>
-          <a:p>
-            <a:pPr marL="231006" indent="-231006" defTabSz="329184">
-              <a:spcBef>
-                <a:spcPts val="800"/>
-              </a:spcBef>
-              <a:buFontTx/>
-              <a:buAutoNum type="arabicPeriod" startAt="1"/>
-              <a:defRPr sz="1728">
-                <a:latin typeface="Times New Roman"/>
-                <a:ea typeface="Times New Roman"/>
-                <a:cs typeface="Times New Roman"/>
-                <a:sym typeface="Times New Roman"/>
-              </a:defRPr>
-            </a:pPr>
-            <a:r>
-              <a:t>Under different people’s control (align incentives)</a:t>
-            </a:r>
-          </a:p>
-          <a:p>
-            <a:pPr lvl="1" marL="576071" indent="-246887" defTabSz="329184">
-              <a:spcBef>
-                <a:spcPts val="800"/>
-              </a:spcBef>
-              <a:buChar char="•"/>
-              <a:defRPr sz="1728">
-                <a:latin typeface="Times New Roman"/>
-                <a:ea typeface="Times New Roman"/>
-                <a:cs typeface="Times New Roman"/>
-                <a:sym typeface="Times New Roman"/>
-              </a:defRPr>
-            </a:pPr>
-            <a:r>
-              <a:t>Corporate governance</a:t>
-            </a:r>
-          </a:p>
-          <a:p>
-            <a:pPr lvl="1" marL="576071" indent="-246887" defTabSz="329184">
-              <a:spcBef>
-                <a:spcPts val="800"/>
-              </a:spcBef>
-              <a:buChar char="•"/>
-              <a:defRPr sz="1728">
-                <a:latin typeface="Times New Roman"/>
-                <a:ea typeface="Times New Roman"/>
-                <a:cs typeface="Times New Roman"/>
-                <a:sym typeface="Times New Roman"/>
-              </a:defRPr>
-            </a:pPr>
-            <a:r>
-              <a:t>Monitoring borrowers (rollover and relationship)</a:t>
-            </a:r>
-          </a:p>
-          <a:p>
-            <a:pPr marL="231006" indent="-231006" defTabSz="329184">
-              <a:spcBef>
-                <a:spcPts val="800"/>
-              </a:spcBef>
-              <a:buFontTx/>
-              <a:buAutoNum type="arabicPeriod" startAt="1"/>
-              <a:defRPr sz="1728">
-                <a:latin typeface="Times New Roman"/>
-                <a:ea typeface="Times New Roman"/>
-                <a:cs typeface="Times New Roman"/>
-                <a:sym typeface="Times New Roman"/>
-              </a:defRPr>
-            </a:pPr>
-            <a:r>
-              <a:t>To achieve scale:</a:t>
-            </a:r>
-          </a:p>
-          <a:p>
-            <a:pPr lvl="1" marL="576071" indent="-246887" defTabSz="329184">
-              <a:spcBef>
-                <a:spcPts val="800"/>
-              </a:spcBef>
-              <a:buChar char="•"/>
-              <a:defRPr sz="1728">
-                <a:latin typeface="Times New Roman"/>
-                <a:ea typeface="Times New Roman"/>
-                <a:cs typeface="Times New Roman"/>
-                <a:sym typeface="Times New Roman"/>
-              </a:defRPr>
-            </a:pPr>
-            <a:r>
-              <a:t>Savings mobilization to realize increasing returns, at least over a range</a:t>
-            </a:r>
-          </a:p>
-          <a:p>
-            <a:pPr lvl="1" marL="576071" indent="-246887" defTabSz="329184">
-              <a:spcBef>
-                <a:spcPts val="800"/>
-              </a:spcBef>
-              <a:buChar char="•"/>
-              <a:defRPr sz="1728">
-                <a:latin typeface="Times New Roman"/>
-                <a:ea typeface="Times New Roman"/>
-                <a:cs typeface="Times New Roman"/>
-                <a:sym typeface="Times New Roman"/>
-              </a:defRPr>
-            </a:pPr>
-            <a:r>
-              <a:t>Convenience (means of payment; intermediation)</a:t>
-            </a:r>
-          </a:p>
-        </p:txBody>
-      </p:sp>
-      <p:pic>
-        <p:nvPicPr>
-          <p:cNvPr id="219" name="Image" descr="Image"/>
-          <p:cNvPicPr>
-            <a:picLocks noChangeAspect="1"/>
-          </p:cNvPicPr>
-          <p:nvPr/>
-        </p:nvPicPr>
-        <p:blipFill>
-          <a:blip r:embed="rId3">
-            <a:extLst/>
-          </a:blip>
-          <a:stretch>
-            <a:fillRect/>
-          </a:stretch>
-        </p:blipFill>
-        <p:spPr>
-          <a:xfrm>
-            <a:off x="5322303" y="1270000"/>
-            <a:ext cx="3527861" cy="5403533"/>
-          </a:xfrm>
-          <a:prstGeom prst="rect">
-            <a:avLst/>
-          </a:prstGeom>
-          <a:ln w="12700">
-            <a:miter lim="400000"/>
-          </a:ln>
-        </p:spPr>
-      </p:pic>
-      <p:sp>
-        <p:nvSpPr>
-          <p:cNvPr id="220" name="3:30"/>
-          <p:cNvSpPr txBox="1"/>
-          <p:nvPr/>
-        </p:nvSpPr>
-        <p:spPr>
-          <a:xfrm>
-            <a:off x="969826" y="6487159"/>
-            <a:ext cx="512898" cy="370841"/>
-          </a:xfrm>
-          <a:prstGeom prst="rect">
-            <a:avLst/>
-          </a:prstGeom>
-          <a:ln w="12700">
-            <a:miter lim="400000"/>
-          </a:ln>
-          <a:extLst>
-            <a:ext uri="{C572A759-6A51-4108-AA02-DFA0A04FC94B}">
-              <ma14:wrappingTextBoxFlag xmlns:ma14="http://schemas.microsoft.com/office/mac/drawingml/2011/main" val="1"/>
-            </a:ext>
-          </a:extLst>
-        </p:spPr>
-        <p:txBody>
-          <a:bodyPr wrap="none" lIns="45719" rIns="45719">
-            <a:spAutoFit/>
-          </a:bodyPr>
-          <a:lstStyle/>
-          <a:p>
-            <a:pPr/>
-            <a:r>
-              <a:t>3:30</a:t>
-            </a:r>
-          </a:p>
-        </p:txBody>
-      </p:sp>
-    </p:spTree>
-  </p:cSld>
-  <p:clrMapOvr>
-    <a:masterClrMapping/>
-  </p:clrMapOvr>
-  <p:transition xmlns:p14="http://schemas.microsoft.com/office/powerpoint/2010/main" spd="med" advClick="1"/>
-</p:sld>
-</file>
-
-<file path=ppt/slides/slide35.xml><?xml version="1.0" encoding="utf-8"?>
-<p:sld xmlns:a="http://schemas.openxmlformats.org/drawingml/2006/main" xmlns:r="http://schemas.openxmlformats.org/officeDocument/2006/relationships" xmlns:p="http://schemas.openxmlformats.org/presentationml/2006/main" xmlns:m="http://schemas.openxmlformats.org/officeDocument/2006/math" xmlns:a14="http://schemas.microsoft.com/office/drawing/2010/main" showMasterSp="1" showMasterPhAnim="1">
-  <p:cSld>
-    <p:spTree>
-      <p:nvGrpSpPr>
-        <p:cNvPr id="1" name=""/>
-        <p:cNvGrpSpPr/>
-        <p:nvPr/>
-      </p:nvGrpSpPr>
-      <p:grpSpPr>
-        <a:xfrm>
-          <a:off x="0" y="0"/>
-          <a:ext cx="0" cy="0"/>
-          <a:chOff x="0" y="0"/>
-          <a:chExt cx="0" cy="0"/>
-        </a:xfrm>
-      </p:grpSpPr>
-      <p:sp>
-        <p:nvSpPr>
-          <p:cNvPr id="224" name="Catch Our Breath…"/>
+          <p:cNvPr id="210" name="Catch Our Breath…"/>
           <p:cNvSpPr txBox="1"/>
           <p:nvPr>
             <p:ph type="title"/>
@@ -12528,7 +11660,7 @@
       </p:sp>
       <p:sp>
         <p:nvSpPr>
-          <p:cNvPr id="225" name="Ask a couple of questions?…"/>
+          <p:cNvPr id="211" name="Ask a couple of questions?…"/>
           <p:cNvSpPr txBox="1"/>
           <p:nvPr>
             <p:ph type="body" sz="half" idx="1"/>
@@ -12598,7 +11730,7 @@
       </p:sp>
       <p:pic>
         <p:nvPicPr>
-          <p:cNvPr id="226" name="Image" descr="Image"/>
+          <p:cNvPr id="212" name="Image" descr="Image"/>
           <p:cNvPicPr>
             <a:picLocks noChangeAspect="1"/>
           </p:cNvPicPr>
@@ -12627,7 +11759,7 @@
       </p:pic>
       <p:sp>
         <p:nvSpPr>
-          <p:cNvPr id="227" name="Rectangle"/>
+          <p:cNvPr id="213" name="Rectangle"/>
           <p:cNvSpPr txBox="1"/>
           <p:nvPr/>
         </p:nvSpPr>

</xml_diff>